<commit_message>
first try to publish
Signed-off-by: MathysDev <michael@mmhu.ch>
</commit_message>
<xml_diff>
--- a/Project_Structure_QA_Bot.pptx
+++ b/Project_Structure_QA_Bot.pptx
@@ -305,7 +305,7 @@
           <a:p>
             <a:fld id="{5BCAD085-E8A6-8845-BD4E-CB4CCA059FC4}" type="datetimeFigureOut">
               <a:rPr lang="en-US" smtClean="0"/>
-              <a:t>1/30/2025</a:t>
+              <a:t>1/31/2025</a:t>
             </a:fld>
             <a:endParaRPr lang="en-US"/>
           </a:p>
@@ -473,7 +473,7 @@
           <a:p>
             <a:fld id="{5BCAD085-E8A6-8845-BD4E-CB4CCA059FC4}" type="datetimeFigureOut">
               <a:rPr lang="en-US" smtClean="0"/>
-              <a:t>1/30/2025</a:t>
+              <a:t>1/31/2025</a:t>
             </a:fld>
             <a:endParaRPr lang="en-US"/>
           </a:p>
@@ -651,7 +651,7 @@
           <a:p>
             <a:fld id="{5BCAD085-E8A6-8845-BD4E-CB4CCA059FC4}" type="datetimeFigureOut">
               <a:rPr lang="en-US" smtClean="0"/>
-              <a:t>1/30/2025</a:t>
+              <a:t>1/31/2025</a:t>
             </a:fld>
             <a:endParaRPr lang="en-US"/>
           </a:p>
@@ -819,7 +819,7 @@
           <a:p>
             <a:fld id="{5BCAD085-E8A6-8845-BD4E-CB4CCA059FC4}" type="datetimeFigureOut">
               <a:rPr lang="en-US" smtClean="0"/>
-              <a:t>1/30/2025</a:t>
+              <a:t>1/31/2025</a:t>
             </a:fld>
             <a:endParaRPr lang="en-US"/>
           </a:p>
@@ -1064,7 +1064,7 @@
           <a:p>
             <a:fld id="{5BCAD085-E8A6-8845-BD4E-CB4CCA059FC4}" type="datetimeFigureOut">
               <a:rPr lang="en-US" smtClean="0"/>
-              <a:t>1/30/2025</a:t>
+              <a:t>1/31/2025</a:t>
             </a:fld>
             <a:endParaRPr lang="en-US"/>
           </a:p>
@@ -1349,7 +1349,7 @@
           <a:p>
             <a:fld id="{5BCAD085-E8A6-8845-BD4E-CB4CCA059FC4}" type="datetimeFigureOut">
               <a:rPr lang="en-US" smtClean="0"/>
-              <a:t>1/30/2025</a:t>
+              <a:t>1/31/2025</a:t>
             </a:fld>
             <a:endParaRPr lang="en-US"/>
           </a:p>
@@ -1768,7 +1768,7 @@
           <a:p>
             <a:fld id="{5BCAD085-E8A6-8845-BD4E-CB4CCA059FC4}" type="datetimeFigureOut">
               <a:rPr lang="en-US" smtClean="0"/>
-              <a:t>1/30/2025</a:t>
+              <a:t>1/31/2025</a:t>
             </a:fld>
             <a:endParaRPr lang="en-US"/>
           </a:p>
@@ -1885,7 +1885,7 @@
           <a:p>
             <a:fld id="{5BCAD085-E8A6-8845-BD4E-CB4CCA059FC4}" type="datetimeFigureOut">
               <a:rPr lang="en-US" smtClean="0"/>
-              <a:t>1/30/2025</a:t>
+              <a:t>1/31/2025</a:t>
             </a:fld>
             <a:endParaRPr lang="en-US"/>
           </a:p>
@@ -1980,7 +1980,7 @@
           <a:p>
             <a:fld id="{5BCAD085-E8A6-8845-BD4E-CB4CCA059FC4}" type="datetimeFigureOut">
               <a:rPr lang="en-US" smtClean="0"/>
-              <a:t>1/30/2025</a:t>
+              <a:t>1/31/2025</a:t>
             </a:fld>
             <a:endParaRPr lang="en-US"/>
           </a:p>
@@ -2255,7 +2255,7 @@
           <a:p>
             <a:fld id="{5BCAD085-E8A6-8845-BD4E-CB4CCA059FC4}" type="datetimeFigureOut">
               <a:rPr lang="en-US" smtClean="0"/>
-              <a:t>1/30/2025</a:t>
+              <a:t>1/31/2025</a:t>
             </a:fld>
             <a:endParaRPr lang="en-US"/>
           </a:p>
@@ -2507,7 +2507,7 @@
           <a:p>
             <a:fld id="{5BCAD085-E8A6-8845-BD4E-CB4CCA059FC4}" type="datetimeFigureOut">
               <a:rPr lang="en-US" smtClean="0"/>
-              <a:t>1/30/2025</a:t>
+              <a:t>1/31/2025</a:t>
             </a:fld>
             <a:endParaRPr lang="en-US"/>
           </a:p>
@@ -2718,7 +2718,7 @@
           <a:p>
             <a:fld id="{5BCAD085-E8A6-8845-BD4E-CB4CCA059FC4}" type="datetimeFigureOut">
               <a:rPr lang="en-US" smtClean="0"/>
-              <a:t>1/30/2025</a:t>
+              <a:t>1/31/2025</a:t>
             </a:fld>
             <a:endParaRPr lang="en-US"/>
           </a:p>
@@ -3323,7 +3323,19 @@
             </a:br>
             <a:r>
               <a:rPr lang="en-US" sz="3200" dirty="0"/>
-              <a:t>  - Choose technologies (Embedding)</a:t>
+              <a:t>  - Choose technologies (Embedding, Web-Framework </a:t>
+            </a:r>
+            <a:r>
+              <a:rPr lang="en-US" sz="3200" dirty="0" err="1">
+                <a:solidFill>
+                  <a:srgbClr val="FF0000"/>
+                </a:solidFill>
+              </a:rPr>
+              <a:t>django</a:t>
+            </a:r>
+            <a:r>
+              <a:rPr lang="en-US" sz="3200" dirty="0"/>
+              <a:t>)</a:t>
             </a:r>
             <a:br>
               <a:rPr lang="en-US" sz="3200" dirty="0"/>
@@ -3384,7 +3396,7 @@
             </a:br>
             <a:r>
               <a:rPr lang="en-US" sz="3200" dirty="0"/>
-              <a:t>  - Select generation component (Apollo?)</a:t>
+              <a:t>  - Select generation component (Apollo/Mistral?)</a:t>
             </a:r>
             <a:br>
               <a:rPr lang="en-US" sz="3200" dirty="0"/>

</xml_diff>